<commit_message>
Source code day08 - SQLite
</commit_message>
<xml_diff>
--- a/Python_10_Sqlite.pptx
+++ b/Python_10_Sqlite.pptx
@@ -207,7 +207,7 @@
           <p:cNvPr id="5122" name="Rectangle 2">
             <a:extLst>
               <a:ext uri="{FF2B5EF4-FFF2-40B4-BE49-F238E27FC236}">
-                <a16:creationId xmlns:a16="http://schemas.microsoft.com/office/drawing/2014/main" id="{94408E82-9513-40F1-B235-A484C54832D3}"/>
+                <a16:creationId xmlns:a16="http://schemas.microsoft.com/office/drawing/2014/main" xmlns="" id="{94408E82-9513-40F1-B235-A484C54832D3}"/>
               </a:ext>
             </a:extLst>
           </p:cNvPr>
@@ -256,7 +256,7 @@
           <p:cNvPr id="5123" name="Rectangle 3">
             <a:extLst>
               <a:ext uri="{FF2B5EF4-FFF2-40B4-BE49-F238E27FC236}">
-                <a16:creationId xmlns:a16="http://schemas.microsoft.com/office/drawing/2014/main" id="{A6557D57-E0CF-48F7-801B-285537AF3C58}"/>
+                <a16:creationId xmlns:a16="http://schemas.microsoft.com/office/drawing/2014/main" xmlns="" id="{A6557D57-E0CF-48F7-801B-285537AF3C58}"/>
               </a:ext>
             </a:extLst>
           </p:cNvPr>
@@ -305,7 +305,7 @@
           <p:cNvPr id="3076" name="Rectangle 4">
             <a:extLst>
               <a:ext uri="{FF2B5EF4-FFF2-40B4-BE49-F238E27FC236}">
-                <a16:creationId xmlns:a16="http://schemas.microsoft.com/office/drawing/2014/main" id="{4BCD564A-9EE5-4DD4-837D-06362045490A}"/>
+                <a16:creationId xmlns:a16="http://schemas.microsoft.com/office/drawing/2014/main" xmlns="" id="{4BCD564A-9EE5-4DD4-837D-06362045490A}"/>
               </a:ext>
             </a:extLst>
           </p:cNvPr>
@@ -362,7 +362,7 @@
           <p:cNvPr id="5125" name="Rectangle 5">
             <a:extLst>
               <a:ext uri="{FF2B5EF4-FFF2-40B4-BE49-F238E27FC236}">
-                <a16:creationId xmlns:a16="http://schemas.microsoft.com/office/drawing/2014/main" id="{E9D279A4-5A88-4D57-B86D-68FB9BCBA7D7}"/>
+                <a16:creationId xmlns:a16="http://schemas.microsoft.com/office/drawing/2014/main" xmlns="" id="{E9D279A4-5A88-4D57-B86D-68FB9BCBA7D7}"/>
               </a:ext>
             </a:extLst>
           </p:cNvPr>
@@ -436,7 +436,7 @@
           <p:cNvPr id="5126" name="Rectangle 6">
             <a:extLst>
               <a:ext uri="{FF2B5EF4-FFF2-40B4-BE49-F238E27FC236}">
-                <a16:creationId xmlns:a16="http://schemas.microsoft.com/office/drawing/2014/main" id="{63848DA2-C3C8-4EF7-B0C6-899512C9C0CF}"/>
+                <a16:creationId xmlns:a16="http://schemas.microsoft.com/office/drawing/2014/main" xmlns="" id="{63848DA2-C3C8-4EF7-B0C6-899512C9C0CF}"/>
               </a:ext>
             </a:extLst>
           </p:cNvPr>
@@ -485,7 +485,7 @@
           <p:cNvPr id="5127" name="Rectangle 7">
             <a:extLst>
               <a:ext uri="{FF2B5EF4-FFF2-40B4-BE49-F238E27FC236}">
-                <a16:creationId xmlns:a16="http://schemas.microsoft.com/office/drawing/2014/main" id="{7FD26C6C-A7E2-4F65-BD2F-6F4F7067A438}"/>
+                <a16:creationId xmlns:a16="http://schemas.microsoft.com/office/drawing/2014/main" xmlns="" id="{7FD26C6C-A7E2-4F65-BD2F-6F4F7067A438}"/>
               </a:ext>
             </a:extLst>
           </p:cNvPr>
@@ -537,6 +537,11 @@
         </p:txBody>
       </p:sp>
     </p:spTree>
+    <p:extLst>
+      <p:ext uri="{BB962C8B-B14F-4D97-AF65-F5344CB8AC3E}">
+        <p14:creationId xmlns:p14="http://schemas.microsoft.com/office/powerpoint/2010/main" val="1578977864"/>
+      </p:ext>
+    </p:extLst>
   </p:cSld>
   <p:clrMap bg1="lt1" tx1="dk1" bg2="lt2" tx2="dk2" accent1="accent1" accent2="accent2" accent3="accent3" accent4="accent4" accent5="accent5" accent6="accent6" hlink="hlink" folHlink="folHlink"/>
   <p:notesStyle>
@@ -2402,7 +2407,7 @@
           <p:cNvPr id="4" name="AutoShape 3">
             <a:extLst>
               <a:ext uri="{FF2B5EF4-FFF2-40B4-BE49-F238E27FC236}">
-                <a16:creationId xmlns:a16="http://schemas.microsoft.com/office/drawing/2014/main" id="{219F6A34-BBE7-48FD-8C2F-2EE0AAD5C383}"/>
+                <a16:creationId xmlns:a16="http://schemas.microsoft.com/office/drawing/2014/main" xmlns="" id="{219F6A34-BBE7-48FD-8C2F-2EE0AAD5C383}"/>
               </a:ext>
             </a:extLst>
           </p:cNvPr>
@@ -2566,7 +2571,7 @@
           <p:cNvPr id="5" name="Picture 1">
             <a:extLst>
               <a:ext uri="{FF2B5EF4-FFF2-40B4-BE49-F238E27FC236}">
-                <a16:creationId xmlns:a16="http://schemas.microsoft.com/office/drawing/2014/main" id="{27862231-246E-4332-BEBA-5DF3C1254109}"/>
+                <a16:creationId xmlns:a16="http://schemas.microsoft.com/office/drawing/2014/main" xmlns="" id="{27862231-246E-4332-BEBA-5DF3C1254109}"/>
               </a:ext>
             </a:extLst>
           </p:cNvPr>
@@ -4865,7 +4870,7 @@
           <p:cNvPr id="1036" name="AutoShape 3">
             <a:extLst>
               <a:ext uri="{FF2B5EF4-FFF2-40B4-BE49-F238E27FC236}">
-                <a16:creationId xmlns:a16="http://schemas.microsoft.com/office/drawing/2014/main" id="{43666117-79D8-4276-89FC-822EBBD9F030}"/>
+                <a16:creationId xmlns:a16="http://schemas.microsoft.com/office/drawing/2014/main" xmlns="" id="{43666117-79D8-4276-89FC-822EBBD9F030}"/>
               </a:ext>
             </a:extLst>
           </p:cNvPr>
@@ -5029,7 +5034,7 @@
           <p:cNvPr id="1027" name="Rectangle 2">
             <a:extLst>
               <a:ext uri="{FF2B5EF4-FFF2-40B4-BE49-F238E27FC236}">
-                <a16:creationId xmlns:a16="http://schemas.microsoft.com/office/drawing/2014/main" id="{FF9D01B5-25A0-42CE-BB67-E61451CBFE12}"/>
+                <a16:creationId xmlns:a16="http://schemas.microsoft.com/office/drawing/2014/main" xmlns="" id="{FF9D01B5-25A0-42CE-BB67-E61451CBFE12}"/>
               </a:ext>
             </a:extLst>
           </p:cNvPr>
@@ -5103,7 +5108,7 @@
           <p:cNvPr id="1028" name="Rectangle 3">
             <a:extLst>
               <a:ext uri="{FF2B5EF4-FFF2-40B4-BE49-F238E27FC236}">
-                <a16:creationId xmlns:a16="http://schemas.microsoft.com/office/drawing/2014/main" id="{469F2A3E-B3D5-4BBF-96CB-148E8720FFA5}"/>
+                <a16:creationId xmlns:a16="http://schemas.microsoft.com/office/drawing/2014/main" xmlns="" id="{469F2A3E-B3D5-4BBF-96CB-148E8720FFA5}"/>
               </a:ext>
             </a:extLst>
           </p:cNvPr>
@@ -5205,7 +5210,7 @@
           <p:cNvPr id="1029" name="Picture 1">
             <a:extLst>
               <a:ext uri="{FF2B5EF4-FFF2-40B4-BE49-F238E27FC236}">
-                <a16:creationId xmlns:a16="http://schemas.microsoft.com/office/drawing/2014/main" id="{3EEB02A6-E3F8-479F-B9B3-32BF0F71A02F}"/>
+                <a16:creationId xmlns:a16="http://schemas.microsoft.com/office/drawing/2014/main" xmlns="" id="{3EEB02A6-E3F8-479F-B9B3-32BF0F71A02F}"/>
               </a:ext>
             </a:extLst>
           </p:cNvPr>
@@ -5265,7 +5270,7 @@
           <p:cNvPr id="1030" name="Slide Number Placeholder 3">
             <a:extLst>
               <a:ext uri="{FF2B5EF4-FFF2-40B4-BE49-F238E27FC236}">
-                <a16:creationId xmlns:a16="http://schemas.microsoft.com/office/drawing/2014/main" id="{FE4B0C15-1F58-4060-89C5-D2749B9B0F4F}"/>
+                <a16:creationId xmlns:a16="http://schemas.microsoft.com/office/drawing/2014/main" xmlns="" id="{FE4B0C15-1F58-4060-89C5-D2749B9B0F4F}"/>
               </a:ext>
             </a:extLst>
           </p:cNvPr>
@@ -7058,7 +7063,7 @@
           <p:cNvPr id="4098" name="Rectangle 2">
             <a:extLst>
               <a:ext uri="{FF2B5EF4-FFF2-40B4-BE49-F238E27FC236}">
-                <a16:creationId xmlns:a16="http://schemas.microsoft.com/office/drawing/2014/main" id="{54777C75-1513-4D41-82C2-F1489BE71BA7}"/>
+                <a16:creationId xmlns:a16="http://schemas.microsoft.com/office/drawing/2014/main" xmlns="" id="{54777C75-1513-4D41-82C2-F1489BE71BA7}"/>
               </a:ext>
             </a:extLst>
           </p:cNvPr>
@@ -7087,7 +7092,7 @@
           <p:cNvPr id="4099" name="Rectangle 3">
             <a:extLst>
               <a:ext uri="{FF2B5EF4-FFF2-40B4-BE49-F238E27FC236}">
-                <a16:creationId xmlns:a16="http://schemas.microsoft.com/office/drawing/2014/main" id="{9BB860C0-F6E8-45A8-A81F-789D2BDA2E69}"/>
+                <a16:creationId xmlns:a16="http://schemas.microsoft.com/office/drawing/2014/main" xmlns="" id="{9BB860C0-F6E8-45A8-A81F-789D2BDA2E69}"/>
               </a:ext>
             </a:extLst>
           </p:cNvPr>
@@ -7125,7 +7130,7 @@
           <p:cNvPr id="4" name="Picture 12" descr="SQLite Logo">
             <a:extLst>
               <a:ext uri="{FF2B5EF4-FFF2-40B4-BE49-F238E27FC236}">
-                <a16:creationId xmlns:a16="http://schemas.microsoft.com/office/drawing/2014/main" id="{DBE38384-7D78-478A-A685-E4F005311D3C}"/>
+                <a16:creationId xmlns:a16="http://schemas.microsoft.com/office/drawing/2014/main" xmlns="" id="{DBE38384-7D78-478A-A685-E4F005311D3C}"/>
               </a:ext>
             </a:extLst>
           </p:cNvPr>
@@ -7185,6 +7190,13 @@
   <p:clrMapOvr>
     <a:masterClrMapping/>
   </p:clrMapOvr>
+  <p:timing>
+    <p:tnLst>
+      <p:par>
+        <p:cTn id="1" dur="indefinite" restart="never" nodeType="tmRoot"/>
+      </p:par>
+    </p:tnLst>
+  </p:timing>
 </p:sld>
 </file>
 
@@ -7485,6 +7497,13 @@
   <p:clrMapOvr>
     <a:masterClrMapping/>
   </p:clrMapOvr>
+  <p:timing>
+    <p:tnLst>
+      <p:par>
+        <p:cTn id="1" dur="indefinite" restart="never" nodeType="tmRoot"/>
+      </p:par>
+    </p:tnLst>
+  </p:timing>
 </p:sld>
 </file>
 
@@ -7748,6 +7767,13 @@
   <p:clrMapOvr>
     <a:masterClrMapping/>
   </p:clrMapOvr>
+  <p:timing>
+    <p:tnLst>
+      <p:par>
+        <p:cTn id="1" dur="indefinite" restart="never" nodeType="tmRoot"/>
+      </p:par>
+    </p:tnLst>
+  </p:timing>
 </p:sld>
 </file>
 
@@ -8026,6 +8052,13 @@
   <p:clrMapOvr>
     <a:masterClrMapping/>
   </p:clrMapOvr>
+  <p:timing>
+    <p:tnLst>
+      <p:par>
+        <p:cTn id="1" dur="indefinite" restart="never" nodeType="tmRoot"/>
+      </p:par>
+    </p:tnLst>
+  </p:timing>
 </p:sld>
 </file>
 
@@ -8404,6 +8437,13 @@
   <p:clrMapOvr>
     <a:masterClrMapping/>
   </p:clrMapOvr>
+  <p:timing>
+    <p:tnLst>
+      <p:par>
+        <p:cTn id="1" dur="indefinite" restart="never" nodeType="tmRoot"/>
+      </p:par>
+    </p:tnLst>
+  </p:timing>
 </p:sld>
 </file>
 
@@ -9017,6 +9057,13 @@
   <p:clrMapOvr>
     <a:masterClrMapping/>
   </p:clrMapOvr>
+  <p:timing>
+    <p:tnLst>
+      <p:par>
+        <p:cTn id="1" dur="indefinite" restart="never" nodeType="tmRoot"/>
+      </p:par>
+    </p:tnLst>
+  </p:timing>
 </p:sld>
 </file>
 
@@ -9042,7 +9089,7 @@
           <p:cNvPr id="2" name="Title 1">
             <a:extLst>
               <a:ext uri="{FF2B5EF4-FFF2-40B4-BE49-F238E27FC236}">
-                <a16:creationId xmlns:a16="http://schemas.microsoft.com/office/drawing/2014/main" id="{4DF935C5-6EF6-4ED7-8A99-16BEFD7331B5}"/>
+                <a16:creationId xmlns:a16="http://schemas.microsoft.com/office/drawing/2014/main" xmlns="" id="{4DF935C5-6EF6-4ED7-8A99-16BEFD7331B5}"/>
               </a:ext>
             </a:extLst>
           </p:cNvPr>
@@ -9070,7 +9117,7 @@
           <p:cNvPr id="3" name="Content Placeholder 2">
             <a:extLst>
               <a:ext uri="{FF2B5EF4-FFF2-40B4-BE49-F238E27FC236}">
-                <a16:creationId xmlns:a16="http://schemas.microsoft.com/office/drawing/2014/main" id="{9BB70651-6599-4C60-9D69-1D4C307FB5DA}"/>
+                <a16:creationId xmlns:a16="http://schemas.microsoft.com/office/drawing/2014/main" xmlns="" id="{9BB70651-6599-4C60-9D69-1D4C307FB5DA}"/>
               </a:ext>
             </a:extLst>
           </p:cNvPr>
@@ -9103,6 +9150,13 @@
   <p:clrMapOvr>
     <a:masterClrMapping/>
   </p:clrMapOvr>
+  <p:timing>
+    <p:tnLst>
+      <p:par>
+        <p:cTn id="1" dur="indefinite" restart="never" nodeType="tmRoot"/>
+      </p:par>
+    </p:tnLst>
+  </p:timing>
 </p:sld>
 </file>
 
@@ -9128,7 +9182,7 @@
           <p:cNvPr id="5" name="Title 4">
             <a:extLst>
               <a:ext uri="{FF2B5EF4-FFF2-40B4-BE49-F238E27FC236}">
-                <a16:creationId xmlns:a16="http://schemas.microsoft.com/office/drawing/2014/main" id="{51375A43-2E69-4A37-989F-2991D2886D94}"/>
+                <a16:creationId xmlns:a16="http://schemas.microsoft.com/office/drawing/2014/main" xmlns="" id="{51375A43-2E69-4A37-989F-2991D2886D94}"/>
               </a:ext>
             </a:extLst>
           </p:cNvPr>
@@ -9156,7 +9210,7 @@
           <p:cNvPr id="6" name="Content Placeholder 5">
             <a:extLst>
               <a:ext uri="{FF2B5EF4-FFF2-40B4-BE49-F238E27FC236}">
-                <a16:creationId xmlns:a16="http://schemas.microsoft.com/office/drawing/2014/main" id="{38F35F1B-CB07-4068-979A-682ED888C4DF}"/>
+                <a16:creationId xmlns:a16="http://schemas.microsoft.com/office/drawing/2014/main" xmlns="" id="{38F35F1B-CB07-4068-979A-682ED888C4DF}"/>
               </a:ext>
             </a:extLst>
           </p:cNvPr>
@@ -9270,6 +9324,13 @@
   <p:clrMapOvr>
     <a:masterClrMapping/>
   </p:clrMapOvr>
+  <p:timing>
+    <p:tnLst>
+      <p:par>
+        <p:cTn id="1" dur="indefinite" restart="never" nodeType="tmRoot"/>
+      </p:par>
+    </p:tnLst>
+  </p:timing>
 </p:sld>
 </file>
 
@@ -9295,7 +9356,7 @@
           <p:cNvPr id="5" name="TextBox 4">
             <a:extLst>
               <a:ext uri="{FF2B5EF4-FFF2-40B4-BE49-F238E27FC236}">
-                <a16:creationId xmlns:a16="http://schemas.microsoft.com/office/drawing/2014/main" id="{593D88AF-692C-40AB-93ED-DE39A1FD0228}"/>
+                <a16:creationId xmlns:a16="http://schemas.microsoft.com/office/drawing/2014/main" xmlns="" id="{593D88AF-692C-40AB-93ED-DE39A1FD0228}"/>
               </a:ext>
             </a:extLst>
           </p:cNvPr>
@@ -9559,7 +9620,7 @@
           <p:cNvPr id="6" name="Rounded Rectangle 5">
             <a:extLst>
               <a:ext uri="{FF2B5EF4-FFF2-40B4-BE49-F238E27FC236}">
-                <a16:creationId xmlns:a16="http://schemas.microsoft.com/office/drawing/2014/main" id="{A736608D-BBAE-492A-A32C-6CF5DEFC4E85}"/>
+                <a16:creationId xmlns:a16="http://schemas.microsoft.com/office/drawing/2014/main" xmlns="" id="{A736608D-BBAE-492A-A32C-6CF5DEFC4E85}"/>
               </a:ext>
             </a:extLst>
           </p:cNvPr>
@@ -9614,6 +9675,13 @@
   <p:clrMapOvr>
     <a:masterClrMapping/>
   </p:clrMapOvr>
+  <p:timing>
+    <p:tnLst>
+      <p:par>
+        <p:cTn id="1" dur="indefinite" restart="never" nodeType="tmRoot"/>
+      </p:par>
+    </p:tnLst>
+  </p:timing>
 </p:sld>
 </file>
 
@@ -9647,10 +9715,10 @@
           <p:cNvPr id="72" name="Rectangle 71">
             <a:extLst>
               <a:ext uri="{FF2B5EF4-FFF2-40B4-BE49-F238E27FC236}">
-                <a16:creationId xmlns:a16="http://schemas.microsoft.com/office/drawing/2014/main" id="{01D0AF59-99C3-4251-AB9A-C966C6AD4400}"/>
+                <a16:creationId xmlns:a16="http://schemas.microsoft.com/office/drawing/2014/main" xmlns="" id="{01D0AF59-99C3-4251-AB9A-C966C6AD4400}"/>
               </a:ext>
               <a:ext uri="{C183D7F6-B498-43B3-948B-1728B52AA6E4}">
-                <adec:decorative xmlns:adec="http://schemas.microsoft.com/office/drawing/2017/decorative" val="1"/>
+                <adec:decorative xmlns:adec="http://schemas.microsoft.com/office/drawing/2017/decorative" xmlns="" val="1"/>
               </a:ext>
             </a:extLst>
           </p:cNvPr>
@@ -9660,7 +9728,7 @@
           <p:nvPr>
             <p:extLst>
               <p:ext uri="{386F3935-93C4-4BCD-93E2-E3B085C9AB24}">
-                <p16:designElem xmlns:p16="http://schemas.microsoft.com/office/powerpoint/2015/main" val="1"/>
+                <p16:designElem xmlns:p16="http://schemas.microsoft.com/office/powerpoint/2015/main" xmlns="" val="1"/>
               </p:ext>
             </p:extLst>
           </p:nvPr>
@@ -9710,10 +9778,10 @@
           <p:cNvPr id="74" name="Rectangle 73">
             <a:extLst>
               <a:ext uri="{FF2B5EF4-FFF2-40B4-BE49-F238E27FC236}">
-                <a16:creationId xmlns:a16="http://schemas.microsoft.com/office/drawing/2014/main" id="{1855405F-37A2-4869-9154-F8BE3BECE6C3}"/>
+                <a16:creationId xmlns:a16="http://schemas.microsoft.com/office/drawing/2014/main" xmlns="" id="{1855405F-37A2-4869-9154-F8BE3BECE6C3}"/>
               </a:ext>
               <a:ext uri="{C183D7F6-B498-43B3-948B-1728B52AA6E4}">
-                <adec:decorative xmlns:adec="http://schemas.microsoft.com/office/drawing/2017/decorative" val="1"/>
+                <adec:decorative xmlns:adec="http://schemas.microsoft.com/office/drawing/2017/decorative" xmlns="" val="1"/>
               </a:ext>
             </a:extLst>
           </p:cNvPr>
@@ -9723,7 +9791,7 @@
           <p:nvPr>
             <p:extLst>
               <p:ext uri="{386F3935-93C4-4BCD-93E2-E3B085C9AB24}">
-                <p16:designElem xmlns:p16="http://schemas.microsoft.com/office/powerpoint/2015/main" val="1"/>
+                <p16:designElem xmlns:p16="http://schemas.microsoft.com/office/powerpoint/2015/main" xmlns="" val="1"/>
               </p:ext>
             </p:extLst>
           </p:nvPr>
@@ -9780,7 +9848,7 @@
           <p:cNvPr id="6147" name="TextBox 4">
             <a:extLst>
               <a:ext uri="{FF2B5EF4-FFF2-40B4-BE49-F238E27FC236}">
-                <a16:creationId xmlns:a16="http://schemas.microsoft.com/office/drawing/2014/main" id="{8A10C173-8334-4905-BAC4-000B12A7D502}"/>
+                <a16:creationId xmlns:a16="http://schemas.microsoft.com/office/drawing/2014/main" xmlns="" id="{8A10C173-8334-4905-BAC4-000B12A7D502}"/>
               </a:ext>
             </a:extLst>
           </p:cNvPr>
@@ -9963,7 +10031,7 @@
           <p:cNvPr id="6" name="Rounded Rectangle 5">
             <a:extLst>
               <a:ext uri="{FF2B5EF4-FFF2-40B4-BE49-F238E27FC236}">
-                <a16:creationId xmlns:a16="http://schemas.microsoft.com/office/drawing/2014/main" id="{419E4844-4580-42AD-97AB-000F7FE0995D}"/>
+                <a16:creationId xmlns:a16="http://schemas.microsoft.com/office/drawing/2014/main" xmlns="" id="{419E4844-4580-42AD-97AB-000F7FE0995D}"/>
               </a:ext>
             </a:extLst>
           </p:cNvPr>
@@ -10353,7 +10421,7 @@
           <p:cNvPr id="7171" name="TextBox 4">
             <a:extLst>
               <a:ext uri="{FF2B5EF4-FFF2-40B4-BE49-F238E27FC236}">
-                <a16:creationId xmlns:a16="http://schemas.microsoft.com/office/drawing/2014/main" id="{FF559B8E-14BD-4FA2-B14F-09FD15AF74B9}"/>
+                <a16:creationId xmlns:a16="http://schemas.microsoft.com/office/drawing/2014/main" xmlns="" id="{FF559B8E-14BD-4FA2-B14F-09FD15AF74B9}"/>
               </a:ext>
             </a:extLst>
           </p:cNvPr>
@@ -10517,7 +10585,7 @@
           <p:cNvPr id="7172" name="Rectangle 6">
             <a:extLst>
               <a:ext uri="{FF2B5EF4-FFF2-40B4-BE49-F238E27FC236}">
-                <a16:creationId xmlns:a16="http://schemas.microsoft.com/office/drawing/2014/main" id="{0E34DE0E-01E8-47B7-8804-89EFFBDDE45A}"/>
+                <a16:creationId xmlns:a16="http://schemas.microsoft.com/office/drawing/2014/main" xmlns="" id="{0E34DE0E-01E8-47B7-8804-89EFFBDDE45A}"/>
               </a:ext>
             </a:extLst>
           </p:cNvPr>
@@ -10965,6 +11033,13 @@
   <p:clrMapOvr>
     <a:masterClrMapping/>
   </p:clrMapOvr>
+  <p:timing>
+    <p:tnLst>
+      <p:par>
+        <p:cTn id="1" dur="indefinite" restart="never" nodeType="tmRoot"/>
+      </p:par>
+    </p:tnLst>
+  </p:timing>
 </p:sld>
 </file>
 
@@ -10990,7 +11065,7 @@
           <p:cNvPr id="8195" name="TextBox 4">
             <a:extLst>
               <a:ext uri="{FF2B5EF4-FFF2-40B4-BE49-F238E27FC236}">
-                <a16:creationId xmlns:a16="http://schemas.microsoft.com/office/drawing/2014/main" id="{61AD66EE-6F82-4A18-9F37-D253FE39098B}"/>
+                <a16:creationId xmlns:a16="http://schemas.microsoft.com/office/drawing/2014/main" xmlns="" id="{61AD66EE-6F82-4A18-9F37-D253FE39098B}"/>
               </a:ext>
             </a:extLst>
           </p:cNvPr>
@@ -11164,7 +11239,7 @@
           <p:cNvPr id="6" name="Rounded Rectangle 5">
             <a:extLst>
               <a:ext uri="{FF2B5EF4-FFF2-40B4-BE49-F238E27FC236}">
-                <a16:creationId xmlns:a16="http://schemas.microsoft.com/office/drawing/2014/main" id="{6B8DDA82-A751-49EC-B121-692E685A36FC}"/>
+                <a16:creationId xmlns:a16="http://schemas.microsoft.com/office/drawing/2014/main" xmlns="" id="{6B8DDA82-A751-49EC-B121-692E685A36FC}"/>
               </a:ext>
             </a:extLst>
           </p:cNvPr>
@@ -11333,7 +11408,7 @@
           <p:cNvPr id="8197" name="TextBox 6">
             <a:extLst>
               <a:ext uri="{FF2B5EF4-FFF2-40B4-BE49-F238E27FC236}">
-                <a16:creationId xmlns:a16="http://schemas.microsoft.com/office/drawing/2014/main" id="{D615C0AB-D242-4A36-B579-9265B391441B}"/>
+                <a16:creationId xmlns:a16="http://schemas.microsoft.com/office/drawing/2014/main" xmlns="" id="{D615C0AB-D242-4A36-B579-9265B391441B}"/>
               </a:ext>
             </a:extLst>
           </p:cNvPr>
@@ -11522,7 +11597,7 @@
           <p:cNvPr id="5" name="TextBox 4">
             <a:extLst>
               <a:ext uri="{FF2B5EF4-FFF2-40B4-BE49-F238E27FC236}">
-                <a16:creationId xmlns:a16="http://schemas.microsoft.com/office/drawing/2014/main" id="{42D8E019-80D9-491C-A26C-5228B0CD681F}"/>
+                <a16:creationId xmlns:a16="http://schemas.microsoft.com/office/drawing/2014/main" xmlns="" id="{42D8E019-80D9-491C-A26C-5228B0CD681F}"/>
               </a:ext>
             </a:extLst>
           </p:cNvPr>
@@ -11596,7 +11671,7 @@
           <p:cNvPr id="6" name="Rounded Rectangle 5">
             <a:extLst>
               <a:ext uri="{FF2B5EF4-FFF2-40B4-BE49-F238E27FC236}">
-                <a16:creationId xmlns:a16="http://schemas.microsoft.com/office/drawing/2014/main" id="{E5730210-010E-4B41-9115-49CA7A2017CE}"/>
+                <a16:creationId xmlns:a16="http://schemas.microsoft.com/office/drawing/2014/main" xmlns="" id="{E5730210-010E-4B41-9115-49CA7A2017CE}"/>
               </a:ext>
             </a:extLst>
           </p:cNvPr>
@@ -12071,6 +12146,13 @@
   <p:clrMapOvr>
     <a:masterClrMapping/>
   </p:clrMapOvr>
+  <p:timing>
+    <p:tnLst>
+      <p:par>
+        <p:cTn id="1" dur="indefinite" restart="never" nodeType="tmRoot"/>
+      </p:par>
+    </p:tnLst>
+  </p:timing>
 </p:sld>
 </file>
 
@@ -12412,6 +12494,13 @@
   <p:clrMapOvr>
     <a:masterClrMapping/>
   </p:clrMapOvr>
+  <p:timing>
+    <p:tnLst>
+      <p:par>
+        <p:cTn id="1" dur="indefinite" restart="never" nodeType="tmRoot"/>
+      </p:par>
+    </p:tnLst>
+  </p:timing>
 </p:sld>
 </file>
 
@@ -12841,6 +12930,13 @@
   <p:clrMapOvr>
     <a:masterClrMapping/>
   </p:clrMapOvr>
+  <p:timing>
+    <p:tnLst>
+      <p:par>
+        <p:cTn id="1" dur="indefinite" restart="never" nodeType="tmRoot"/>
+      </p:par>
+    </p:tnLst>
+  </p:timing>
 </p:sld>
 </file>
 
@@ -13090,6 +13186,13 @@
   <p:clrMapOvr>
     <a:masterClrMapping/>
   </p:clrMapOvr>
+  <p:timing>
+    <p:tnLst>
+      <p:par>
+        <p:cTn id="1" dur="indefinite" restart="never" nodeType="tmRoot"/>
+      </p:par>
+    </p:tnLst>
+  </p:timing>
 </p:sld>
 </file>
 
@@ -13459,6 +13562,13 @@
   <p:clrMapOvr>
     <a:masterClrMapping/>
   </p:clrMapOvr>
+  <p:timing>
+    <p:tnLst>
+      <p:par>
+        <p:cTn id="1" dur="indefinite" restart="never" nodeType="tmRoot"/>
+      </p:par>
+    </p:tnLst>
+  </p:timing>
 </p:sld>
 </file>
 
@@ -14481,6 +14591,13 @@
   <p:clrMapOvr>
     <a:masterClrMapping/>
   </p:clrMapOvr>
+  <p:timing>
+    <p:tnLst>
+      <p:par>
+        <p:cTn id="1" dur="indefinite" restart="never" nodeType="tmRoot"/>
+      </p:par>
+    </p:tnLst>
+  </p:timing>
 </p:sld>
 </file>
 
@@ -15175,6 +15292,13 @@
       <p:transition spd="slow" advClick="0"/>
     </mc:Fallback>
   </mc:AlternateContent>
+  <p:timing>
+    <p:tnLst>
+      <p:par>
+        <p:cTn id="1" dur="indefinite" restart="never" nodeType="tmRoot"/>
+      </p:par>
+    </p:tnLst>
+  </p:timing>
 </p:sld>
 </file>
 

</xml_diff>